<commit_message>
Fixes build error in frontend.
MainViewModel descriptor logic was used.
OpenDataFile execution was fixed.
</commit_message>
<xml_diff>
--- a/Presentation/evoShapeRecognizer/Session03/Backpropagation.pptx
+++ b/Presentation/evoShapeRecognizer/Session03/Backpropagation.pptx
@@ -112,6 +112,11 @@
       </a:defRPr>
     </a:lvl9pPr>
   </p:defaultTextStyle>
+  <p:extLst>
+    <p:ext uri="{EFAFB233-063F-42B5-8137-9DF3F51BA10A}">
+      <p15:sldGuideLst xmlns:p15="http://schemas.microsoft.com/office/powerpoint/2012/main"/>
+    </p:ext>
+  </p:extLst>
 </p:presentation>
 </file>
 
@@ -3651,7 +3656,7 @@
 </file>
 
 <file path=ppt/slides/slide1.xml><?xml version="1.0" encoding="utf-8"?>
-<p:sld xmlns:a="http://schemas.openxmlformats.org/drawingml/2006/main" xmlns:r="http://schemas.openxmlformats.org/officeDocument/2006/relationships" xmlns:p="http://schemas.openxmlformats.org/presentationml/2006/main">
+<p:sld xmlns:a="http://schemas.openxmlformats.org/drawingml/2006/main" xmlns:r="http://schemas.openxmlformats.org/officeDocument/2006/relationships" xmlns:p="http://schemas.openxmlformats.org/presentationml/2006/main" show="0">
   <p:cSld>
     <p:spTree>
       <p:nvGrpSpPr>
@@ -3741,7 +3746,7 @@
 </file>
 
 <file path=ppt/slides/slide2.xml><?xml version="1.0" encoding="utf-8"?>
-<p:sld xmlns:a="http://schemas.openxmlformats.org/drawingml/2006/main" xmlns:r="http://schemas.openxmlformats.org/officeDocument/2006/relationships" xmlns:p="http://schemas.openxmlformats.org/presentationml/2006/main">
+<p:sld xmlns:a="http://schemas.openxmlformats.org/drawingml/2006/main" xmlns:r="http://schemas.openxmlformats.org/officeDocument/2006/relationships" xmlns:p="http://schemas.openxmlformats.org/presentationml/2006/main" show="0">
   <p:cSld>
     <p:spTree>
       <p:nvGrpSpPr>
@@ -5173,7 +5178,7 @@
 </file>
 
 <file path=ppt/slides/slide3.xml><?xml version="1.0" encoding="utf-8"?>
-<p:sld xmlns:a="http://schemas.openxmlformats.org/drawingml/2006/main" xmlns:r="http://schemas.openxmlformats.org/officeDocument/2006/relationships" xmlns:p="http://schemas.openxmlformats.org/presentationml/2006/main">
+<p:sld xmlns:a="http://schemas.openxmlformats.org/drawingml/2006/main" xmlns:r="http://schemas.openxmlformats.org/officeDocument/2006/relationships" xmlns:p="http://schemas.openxmlformats.org/presentationml/2006/main" show="0">
   <p:cSld>
     <p:spTree>
       <p:nvGrpSpPr>
@@ -5714,8 +5719,8 @@
           </a:p>
         </p:txBody>
       </p:sp>
-      <mc:AlternateContent xmlns:mc="http://schemas.openxmlformats.org/markup-compatibility/2006">
-        <mc:Choice xmlns:a14="http://schemas.microsoft.com/office/drawing/2010/main" Requires="a14">
+      <mc:AlternateContent xmlns:mc="http://schemas.openxmlformats.org/markup-compatibility/2006" xmlns:a14="http://schemas.microsoft.com/office/drawing/2010/main">
+        <mc:Choice Requires="a14">
           <p:sp>
             <p:nvSpPr>
               <p:cNvPr id="23" name="TextBox 22">
@@ -5744,6 +5749,7 @@
               </a:bodyPr>
               <a:lstStyle/>
               <a:p>
+                <a:pPr/>
                 <a14:m>
                   <m:oMathPara xmlns:m="http://schemas.openxmlformats.org/officeDocument/2006/math">
                     <m:oMathParaPr>
@@ -5764,7 +5770,7 @@
             </p:txBody>
           </p:sp>
         </mc:Choice>
-        <mc:Fallback>
+        <mc:Fallback xmlns="">
           <p:sp>
             <p:nvSpPr>
               <p:cNvPr id="23" name="TextBox 22">
@@ -5809,8 +5815,8 @@
           </p:sp>
         </mc:Fallback>
       </mc:AlternateContent>
-      <mc:AlternateContent xmlns:mc="http://schemas.openxmlformats.org/markup-compatibility/2006">
-        <mc:Choice xmlns:a14="http://schemas.microsoft.com/office/drawing/2010/main" Requires="a14">
+      <mc:AlternateContent xmlns:mc="http://schemas.openxmlformats.org/markup-compatibility/2006" xmlns:a14="http://schemas.microsoft.com/office/drawing/2010/main">
+        <mc:Choice Requires="a14">
           <p:sp>
             <p:nvSpPr>
               <p:cNvPr id="24" name="TextBox 23">
@@ -5839,6 +5845,7 @@
               </a:bodyPr>
               <a:lstStyle/>
               <a:p>
+                <a:pPr/>
                 <a14:m>
                   <m:oMathPara xmlns:m="http://schemas.openxmlformats.org/officeDocument/2006/math">
                     <m:oMathParaPr>
@@ -5859,7 +5866,7 @@
             </p:txBody>
           </p:sp>
         </mc:Choice>
-        <mc:Fallback>
+        <mc:Fallback xmlns="">
           <p:sp>
             <p:nvSpPr>
               <p:cNvPr id="24" name="TextBox 23">
@@ -5947,8 +5954,8 @@
           </a:fontRef>
         </p:style>
       </p:cxnSp>
-      <mc:AlternateContent xmlns:mc="http://schemas.openxmlformats.org/markup-compatibility/2006">
-        <mc:Choice xmlns:a14="http://schemas.microsoft.com/office/drawing/2010/main" Requires="a14">
+      <mc:AlternateContent xmlns:mc="http://schemas.openxmlformats.org/markup-compatibility/2006" xmlns:a14="http://schemas.microsoft.com/office/drawing/2010/main">
+        <mc:Choice Requires="a14">
           <p:sp>
             <p:nvSpPr>
               <p:cNvPr id="39" name="TextBox 38">
@@ -6270,7 +6277,7 @@
             </p:txBody>
           </p:sp>
         </mc:Choice>
-        <mc:Fallback>
+        <mc:Fallback xmlns="">
           <p:sp>
             <p:nvSpPr>
               <p:cNvPr id="39" name="TextBox 38">
@@ -6423,8 +6430,8 @@
           </a:p>
         </p:txBody>
       </p:sp>
-      <mc:AlternateContent xmlns:mc="http://schemas.openxmlformats.org/markup-compatibility/2006">
-        <mc:Choice xmlns:a14="http://schemas.microsoft.com/office/drawing/2010/main" Requires="a14">
+      <mc:AlternateContent xmlns:mc="http://schemas.openxmlformats.org/markup-compatibility/2006" xmlns:a14="http://schemas.microsoft.com/office/drawing/2010/main">
+        <mc:Choice Requires="a14">
           <p:sp>
             <p:nvSpPr>
               <p:cNvPr id="44" name="TextBox 43">
@@ -6453,6 +6460,7 @@
               </a:bodyPr>
               <a:lstStyle/>
               <a:p>
+                <a:pPr/>
                 <a14:m>
                   <m:oMathPara xmlns:m="http://schemas.openxmlformats.org/officeDocument/2006/math">
                     <m:oMathParaPr>
@@ -6533,7 +6541,7 @@
             </p:txBody>
           </p:sp>
         </mc:Choice>
-        <mc:Fallback>
+        <mc:Fallback xmlns="">
           <p:sp>
             <p:nvSpPr>
               <p:cNvPr id="44" name="TextBox 43">
@@ -6578,8 +6586,8 @@
           </p:sp>
         </mc:Fallback>
       </mc:AlternateContent>
-      <mc:AlternateContent xmlns:mc="http://schemas.openxmlformats.org/markup-compatibility/2006">
-        <mc:Choice xmlns:a14="http://schemas.microsoft.com/office/drawing/2010/main" Requires="a14">
+      <mc:AlternateContent xmlns:mc="http://schemas.openxmlformats.org/markup-compatibility/2006" xmlns:a14="http://schemas.microsoft.com/office/drawing/2010/main">
+        <mc:Choice Requires="a14">
           <p:sp>
             <p:nvSpPr>
               <p:cNvPr id="46" name="TextBox 45">
@@ -6608,6 +6616,7 @@
               </a:bodyPr>
               <a:lstStyle/>
               <a:p>
+                <a:pPr/>
                 <a14:m>
                   <m:oMathPara xmlns:m="http://schemas.openxmlformats.org/officeDocument/2006/math">
                     <m:oMathParaPr>
@@ -6658,7 +6667,7 @@
             </p:txBody>
           </p:sp>
         </mc:Choice>
-        <mc:Fallback>
+        <mc:Fallback xmlns="">
           <p:sp>
             <p:nvSpPr>
               <p:cNvPr id="46" name="TextBox 45">
@@ -6703,8 +6712,8 @@
           </p:sp>
         </mc:Fallback>
       </mc:AlternateContent>
-      <mc:AlternateContent xmlns:mc="http://schemas.openxmlformats.org/markup-compatibility/2006">
-        <mc:Choice xmlns:a14="http://schemas.microsoft.com/office/drawing/2010/main" Requires="a14">
+      <mc:AlternateContent xmlns:mc="http://schemas.openxmlformats.org/markup-compatibility/2006" xmlns:a14="http://schemas.microsoft.com/office/drawing/2010/main">
+        <mc:Choice Requires="a14">
           <p:sp>
             <p:nvSpPr>
               <p:cNvPr id="55" name="TextBox 54">
@@ -6733,6 +6742,7 @@
               </a:bodyPr>
               <a:lstStyle/>
               <a:p>
+                <a:pPr/>
                 <a14:m>
                   <m:oMathPara xmlns:m="http://schemas.openxmlformats.org/officeDocument/2006/math">
                     <m:oMathParaPr>
@@ -6833,7 +6843,7 @@
             </p:txBody>
           </p:sp>
         </mc:Choice>
-        <mc:Fallback>
+        <mc:Fallback xmlns="">
           <p:sp>
             <p:nvSpPr>
               <p:cNvPr id="55" name="TextBox 54">
@@ -6878,8 +6888,8 @@
           </p:sp>
         </mc:Fallback>
       </mc:AlternateContent>
-      <mc:AlternateContent xmlns:mc="http://schemas.openxmlformats.org/markup-compatibility/2006">
-        <mc:Choice xmlns:a14="http://schemas.microsoft.com/office/drawing/2010/main" Requires="a14">
+      <mc:AlternateContent xmlns:mc="http://schemas.openxmlformats.org/markup-compatibility/2006" xmlns:a14="http://schemas.microsoft.com/office/drawing/2010/main">
+        <mc:Choice Requires="a14">
           <p:sp>
             <p:nvSpPr>
               <p:cNvPr id="58" name="TextBox 57">
@@ -6908,6 +6918,7 @@
               </a:bodyPr>
               <a:lstStyle/>
               <a:p>
+                <a:pPr/>
                 <a14:m>
                   <m:oMathPara xmlns:m="http://schemas.openxmlformats.org/officeDocument/2006/math">
                     <m:oMathParaPr>
@@ -6931,7 +6942,7 @@
             </p:txBody>
           </p:sp>
         </mc:Choice>
-        <mc:Fallback>
+        <mc:Fallback xmlns="">
           <p:sp>
             <p:nvSpPr>
               <p:cNvPr id="58" name="TextBox 57">
@@ -6976,8 +6987,8 @@
           </p:sp>
         </mc:Fallback>
       </mc:AlternateContent>
-      <mc:AlternateContent xmlns:mc="http://schemas.openxmlformats.org/markup-compatibility/2006">
-        <mc:Choice xmlns:a14="http://schemas.microsoft.com/office/drawing/2010/main" Requires="a14">
+      <mc:AlternateContent xmlns:mc="http://schemas.openxmlformats.org/markup-compatibility/2006" xmlns:a14="http://schemas.microsoft.com/office/drawing/2010/main">
+        <mc:Choice Requires="a14">
           <p:sp>
             <p:nvSpPr>
               <p:cNvPr id="59" name="TextBox 58">
@@ -7006,6 +7017,7 @@
               </a:bodyPr>
               <a:lstStyle/>
               <a:p>
+                <a:pPr/>
                 <a14:m>
                   <m:oMathPara xmlns:m="http://schemas.openxmlformats.org/officeDocument/2006/math">
                     <m:oMathParaPr>
@@ -7035,7 +7047,7 @@
             </p:txBody>
           </p:sp>
         </mc:Choice>
-        <mc:Fallback>
+        <mc:Fallback xmlns="">
           <p:sp>
             <p:nvSpPr>
               <p:cNvPr id="59" name="TextBox 58">
@@ -7080,8 +7092,8 @@
           </p:sp>
         </mc:Fallback>
       </mc:AlternateContent>
-      <mc:AlternateContent xmlns:mc="http://schemas.openxmlformats.org/markup-compatibility/2006">
-        <mc:Choice xmlns:a14="http://schemas.microsoft.com/office/drawing/2010/main" Requires="a14">
+      <mc:AlternateContent xmlns:mc="http://schemas.openxmlformats.org/markup-compatibility/2006" xmlns:a14="http://schemas.microsoft.com/office/drawing/2010/main">
+        <mc:Choice Requires="a14">
           <p:sp>
             <p:nvSpPr>
               <p:cNvPr id="60" name="TextBox 59">
@@ -7110,6 +7122,7 @@
               </a:bodyPr>
               <a:lstStyle/>
               <a:p>
+                <a:pPr/>
                 <a14:m>
                   <m:oMathPara xmlns:m="http://schemas.openxmlformats.org/officeDocument/2006/math">
                     <m:oMathParaPr>
@@ -7171,7 +7184,7 @@
             </p:txBody>
           </p:sp>
         </mc:Choice>
-        <mc:Fallback>
+        <mc:Fallback xmlns="">
           <p:sp>
             <p:nvSpPr>
               <p:cNvPr id="60" name="TextBox 59">
@@ -7252,8 +7265,8 @@
           </a:p>
         </p:txBody>
       </p:sp>
-      <mc:AlternateContent xmlns:mc="http://schemas.openxmlformats.org/markup-compatibility/2006">
-        <mc:Choice xmlns:a14="http://schemas.microsoft.com/office/drawing/2010/main" Requires="a14">
+      <mc:AlternateContent xmlns:mc="http://schemas.openxmlformats.org/markup-compatibility/2006" xmlns:a14="http://schemas.microsoft.com/office/drawing/2010/main">
+        <mc:Choice Requires="a14">
           <p:sp>
             <p:nvSpPr>
               <p:cNvPr id="63" name="TextBox 62">
@@ -7282,6 +7295,7 @@
               </a:bodyPr>
               <a:lstStyle/>
               <a:p>
+                <a:pPr/>
                 <a14:m>
                   <m:oMathPara xmlns:m="http://schemas.openxmlformats.org/officeDocument/2006/math">
                     <m:oMathParaPr>
@@ -7343,7 +7357,7 @@
             </p:txBody>
           </p:sp>
         </mc:Choice>
-        <mc:Fallback>
+        <mc:Fallback xmlns="">
           <p:sp>
             <p:nvSpPr>
               <p:cNvPr id="63" name="TextBox 62">
@@ -7388,8 +7402,8 @@
           </p:sp>
         </mc:Fallback>
       </mc:AlternateContent>
-      <mc:AlternateContent xmlns:mc="http://schemas.openxmlformats.org/markup-compatibility/2006">
-        <mc:Choice xmlns:a14="http://schemas.microsoft.com/office/drawing/2010/main" Requires="a14">
+      <mc:AlternateContent xmlns:mc="http://schemas.openxmlformats.org/markup-compatibility/2006" xmlns:a14="http://schemas.microsoft.com/office/drawing/2010/main">
+        <mc:Choice Requires="a14">
           <p:sp>
             <p:nvSpPr>
               <p:cNvPr id="64" name="TextBox 63">
@@ -7418,6 +7432,7 @@
               </a:bodyPr>
               <a:lstStyle/>
               <a:p>
+                <a:pPr/>
                 <a14:m>
                   <m:oMathPara xmlns:m="http://schemas.openxmlformats.org/officeDocument/2006/math">
                     <m:oMathParaPr>
@@ -7445,7 +7460,7 @@
             </p:txBody>
           </p:sp>
         </mc:Choice>
-        <mc:Fallback>
+        <mc:Fallback xmlns="">
           <p:sp>
             <p:nvSpPr>
               <p:cNvPr id="64" name="TextBox 63">
@@ -7490,8 +7505,8 @@
           </p:sp>
         </mc:Fallback>
       </mc:AlternateContent>
-      <mc:AlternateContent xmlns:mc="http://schemas.openxmlformats.org/markup-compatibility/2006">
-        <mc:Choice xmlns:a14="http://schemas.microsoft.com/office/drawing/2010/main" Requires="a14">
+      <mc:AlternateContent xmlns:mc="http://schemas.openxmlformats.org/markup-compatibility/2006" xmlns:a14="http://schemas.microsoft.com/office/drawing/2010/main">
+        <mc:Choice Requires="a14">
           <p:sp>
             <p:nvSpPr>
               <p:cNvPr id="66" name="TextBox 65">
@@ -7520,6 +7535,7 @@
               </a:bodyPr>
               <a:lstStyle/>
               <a:p>
+                <a:pPr/>
                 <a14:m>
                   <m:oMathPara xmlns:m="http://schemas.openxmlformats.org/officeDocument/2006/math">
                     <m:oMathParaPr>
@@ -7547,7 +7563,7 @@
             </p:txBody>
           </p:sp>
         </mc:Choice>
-        <mc:Fallback>
+        <mc:Fallback xmlns="">
           <p:sp>
             <p:nvSpPr>
               <p:cNvPr id="66" name="TextBox 65">
@@ -8098,7 +8114,7 @@
 </file>
 
 <file path=ppt/slides/slide4.xml><?xml version="1.0" encoding="utf-8"?>
-<p:sld xmlns:a="http://schemas.openxmlformats.org/drawingml/2006/main" xmlns:r="http://schemas.openxmlformats.org/officeDocument/2006/relationships" xmlns:p="http://schemas.openxmlformats.org/presentationml/2006/main">
+<p:sld xmlns:a="http://schemas.openxmlformats.org/drawingml/2006/main" xmlns:r="http://schemas.openxmlformats.org/officeDocument/2006/relationships" xmlns:p="http://schemas.openxmlformats.org/presentationml/2006/main" show="0">
   <p:cSld>
     <p:spTree>
       <p:nvGrpSpPr>
@@ -8147,8 +8163,8 @@
           </a:p>
         </p:txBody>
       </p:sp>
-      <mc:AlternateContent xmlns:mc="http://schemas.openxmlformats.org/markup-compatibility/2006">
-        <mc:Choice xmlns:a14="http://schemas.microsoft.com/office/drawing/2010/main" Requires="a14">
+      <mc:AlternateContent xmlns:mc="http://schemas.openxmlformats.org/markup-compatibility/2006" xmlns:a14="http://schemas.microsoft.com/office/drawing/2010/main">
+        <mc:Choice Requires="a14">
           <p:sp>
             <p:nvSpPr>
               <p:cNvPr id="4" name="TextBox 3">
@@ -8470,7 +8486,7 @@
             </p:txBody>
           </p:sp>
         </mc:Choice>
-        <mc:Fallback>
+        <mc:Fallback xmlns="">
           <p:sp>
             <p:nvSpPr>
               <p:cNvPr id="4" name="TextBox 3">
@@ -8515,8 +8531,8 @@
           </p:sp>
         </mc:Fallback>
       </mc:AlternateContent>
-      <mc:AlternateContent xmlns:mc="http://schemas.openxmlformats.org/markup-compatibility/2006">
-        <mc:Choice xmlns:a14="http://schemas.microsoft.com/office/drawing/2010/main" Requires="a14">
+      <mc:AlternateContent xmlns:mc="http://schemas.openxmlformats.org/markup-compatibility/2006" xmlns:a14="http://schemas.microsoft.com/office/drawing/2010/main">
+        <mc:Choice Requires="a14">
           <p:sp>
             <p:nvSpPr>
               <p:cNvPr id="5" name="TextBox 4">
@@ -8545,6 +8561,7 @@
               </a:bodyPr>
               <a:lstStyle/>
               <a:p>
+                <a:pPr/>
                 <a14:m>
                   <m:oMathPara xmlns:m="http://schemas.openxmlformats.org/officeDocument/2006/math">
                     <m:oMathParaPr>
@@ -8625,7 +8642,7 @@
             </p:txBody>
           </p:sp>
         </mc:Choice>
-        <mc:Fallback>
+        <mc:Fallback xmlns="">
           <p:sp>
             <p:nvSpPr>
               <p:cNvPr id="5" name="TextBox 4">
@@ -8670,8 +8687,8 @@
           </p:sp>
         </mc:Fallback>
       </mc:AlternateContent>
-      <mc:AlternateContent xmlns:mc="http://schemas.openxmlformats.org/markup-compatibility/2006">
-        <mc:Choice xmlns:a14="http://schemas.microsoft.com/office/drawing/2010/main" Requires="a14">
+      <mc:AlternateContent xmlns:mc="http://schemas.openxmlformats.org/markup-compatibility/2006" xmlns:a14="http://schemas.microsoft.com/office/drawing/2010/main">
+        <mc:Choice Requires="a14">
           <p:sp>
             <p:nvSpPr>
               <p:cNvPr id="6" name="TextBox 5">
@@ -8700,6 +8717,7 @@
               </a:bodyPr>
               <a:lstStyle/>
               <a:p>
+                <a:pPr/>
                 <a14:m>
                   <m:oMathPara xmlns:m="http://schemas.openxmlformats.org/officeDocument/2006/math">
                     <m:oMathParaPr>
@@ -8750,7 +8768,7 @@
             </p:txBody>
           </p:sp>
         </mc:Choice>
-        <mc:Fallback>
+        <mc:Fallback xmlns="">
           <p:sp>
             <p:nvSpPr>
               <p:cNvPr id="6" name="TextBox 5">
@@ -8795,8 +8813,8 @@
           </p:sp>
         </mc:Fallback>
       </mc:AlternateContent>
-      <mc:AlternateContent xmlns:mc="http://schemas.openxmlformats.org/markup-compatibility/2006">
-        <mc:Choice xmlns:a14="http://schemas.microsoft.com/office/drawing/2010/main" Requires="a14">
+      <mc:AlternateContent xmlns:mc="http://schemas.openxmlformats.org/markup-compatibility/2006" xmlns:a14="http://schemas.microsoft.com/office/drawing/2010/main">
+        <mc:Choice Requires="a14">
           <p:sp>
             <p:nvSpPr>
               <p:cNvPr id="7" name="TextBox 6">
@@ -8825,6 +8843,7 @@
               </a:bodyPr>
               <a:lstStyle/>
               <a:p>
+                <a:pPr/>
                 <a14:m>
                   <m:oMathPara xmlns:m="http://schemas.openxmlformats.org/officeDocument/2006/math">
                     <m:oMathParaPr>
@@ -8925,7 +8944,7 @@
             </p:txBody>
           </p:sp>
         </mc:Choice>
-        <mc:Fallback>
+        <mc:Fallback xmlns="">
           <p:sp>
             <p:nvSpPr>
               <p:cNvPr id="7" name="TextBox 6">
@@ -8970,8 +8989,8 @@
           </p:sp>
         </mc:Fallback>
       </mc:AlternateContent>
-      <mc:AlternateContent xmlns:mc="http://schemas.openxmlformats.org/markup-compatibility/2006">
-        <mc:Choice xmlns:a14="http://schemas.microsoft.com/office/drawing/2010/main" Requires="a14">
+      <mc:AlternateContent xmlns:mc="http://schemas.openxmlformats.org/markup-compatibility/2006" xmlns:a14="http://schemas.microsoft.com/office/drawing/2010/main">
+        <mc:Choice Requires="a14">
           <p:sp>
             <p:nvSpPr>
               <p:cNvPr id="8" name="TextBox 7">
@@ -9000,6 +9019,7 @@
               </a:bodyPr>
               <a:lstStyle/>
               <a:p>
+                <a:pPr/>
                 <a14:m>
                   <m:oMathPara xmlns:m="http://schemas.openxmlformats.org/officeDocument/2006/math">
                     <m:oMathParaPr>
@@ -9023,7 +9043,7 @@
             </p:txBody>
           </p:sp>
         </mc:Choice>
-        <mc:Fallback>
+        <mc:Fallback xmlns="">
           <p:sp>
             <p:nvSpPr>
               <p:cNvPr id="8" name="TextBox 7">
@@ -9068,8 +9088,8 @@
           </p:sp>
         </mc:Fallback>
       </mc:AlternateContent>
-      <mc:AlternateContent xmlns:mc="http://schemas.openxmlformats.org/markup-compatibility/2006">
-        <mc:Choice xmlns:a14="http://schemas.microsoft.com/office/drawing/2010/main" Requires="a14">
+      <mc:AlternateContent xmlns:mc="http://schemas.openxmlformats.org/markup-compatibility/2006" xmlns:a14="http://schemas.microsoft.com/office/drawing/2010/main">
+        <mc:Choice Requires="a14">
           <p:sp>
             <p:nvSpPr>
               <p:cNvPr id="9" name="TextBox 8">
@@ -9098,6 +9118,7 @@
               </a:bodyPr>
               <a:lstStyle/>
               <a:p>
+                <a:pPr/>
                 <a14:m>
                   <m:oMathPara xmlns:m="http://schemas.openxmlformats.org/officeDocument/2006/math">
                     <m:oMathParaPr>
@@ -9182,7 +9203,7 @@
             </p:txBody>
           </p:sp>
         </mc:Choice>
-        <mc:Fallback>
+        <mc:Fallback xmlns="">
           <p:sp>
             <p:nvSpPr>
               <p:cNvPr id="9" name="TextBox 8">
@@ -9227,8 +9248,8 @@
           </p:sp>
         </mc:Fallback>
       </mc:AlternateContent>
-      <mc:AlternateContent xmlns:mc="http://schemas.openxmlformats.org/markup-compatibility/2006">
-        <mc:Choice xmlns:a14="http://schemas.microsoft.com/office/drawing/2010/main" Requires="a14">
+      <mc:AlternateContent xmlns:mc="http://schemas.openxmlformats.org/markup-compatibility/2006" xmlns:a14="http://schemas.microsoft.com/office/drawing/2010/main">
+        <mc:Choice Requires="a14">
           <p:sp>
             <p:nvSpPr>
               <p:cNvPr id="10" name="TextBox 9">
@@ -9257,6 +9278,7 @@
               </a:bodyPr>
               <a:lstStyle/>
               <a:p>
+                <a:pPr/>
                 <a14:m>
                   <m:oMathPara xmlns:m="http://schemas.openxmlformats.org/officeDocument/2006/math">
                     <m:oMathParaPr>
@@ -9374,7 +9396,7 @@
             </p:txBody>
           </p:sp>
         </mc:Choice>
-        <mc:Fallback>
+        <mc:Fallback xmlns="">
           <p:sp>
             <p:nvSpPr>
               <p:cNvPr id="10" name="TextBox 9">
@@ -9419,8 +9441,8 @@
           </p:sp>
         </mc:Fallback>
       </mc:AlternateContent>
-      <mc:AlternateContent xmlns:mc="http://schemas.openxmlformats.org/markup-compatibility/2006">
-        <mc:Choice xmlns:a14="http://schemas.microsoft.com/office/drawing/2010/main" Requires="a14">
+      <mc:AlternateContent xmlns:mc="http://schemas.openxmlformats.org/markup-compatibility/2006" xmlns:a14="http://schemas.microsoft.com/office/drawing/2010/main">
+        <mc:Choice Requires="a14">
           <p:sp>
             <p:nvSpPr>
               <p:cNvPr id="11" name="TextBox 10">
@@ -9449,6 +9471,7 @@
               </a:bodyPr>
               <a:lstStyle/>
               <a:p>
+                <a:pPr/>
                 <a14:m>
                   <m:oMathPara xmlns:m="http://schemas.openxmlformats.org/officeDocument/2006/math">
                     <m:oMathParaPr>
@@ -9542,7 +9565,7 @@
             </p:txBody>
           </p:sp>
         </mc:Choice>
-        <mc:Fallback>
+        <mc:Fallback xmlns="">
           <p:sp>
             <p:nvSpPr>
               <p:cNvPr id="11" name="TextBox 10">
@@ -9587,8 +9610,8 @@
           </p:sp>
         </mc:Fallback>
       </mc:AlternateContent>
-      <mc:AlternateContent xmlns:mc="http://schemas.openxmlformats.org/markup-compatibility/2006">
-        <mc:Choice xmlns:a14="http://schemas.microsoft.com/office/drawing/2010/main" Requires="a14">
+      <mc:AlternateContent xmlns:mc="http://schemas.openxmlformats.org/markup-compatibility/2006" xmlns:a14="http://schemas.microsoft.com/office/drawing/2010/main">
+        <mc:Choice Requires="a14">
           <p:sp>
             <p:nvSpPr>
               <p:cNvPr id="12" name="TextBox 11">
@@ -9617,6 +9640,7 @@
               </a:bodyPr>
               <a:lstStyle/>
               <a:p>
+                <a:pPr/>
                 <a14:m>
                   <m:oMathPara xmlns:m="http://schemas.openxmlformats.org/officeDocument/2006/math">
                     <m:oMathParaPr>
@@ -9739,7 +9763,7 @@
             </p:txBody>
           </p:sp>
         </mc:Choice>
-        <mc:Fallback>
+        <mc:Fallback xmlns="">
           <p:sp>
             <p:nvSpPr>
               <p:cNvPr id="12" name="TextBox 11">
@@ -10036,8 +10060,8 @@
           </a:fontRef>
         </p:style>
       </p:cxnSp>
-      <mc:AlternateContent xmlns:mc="http://schemas.openxmlformats.org/markup-compatibility/2006">
-        <mc:Choice xmlns:a14="http://schemas.microsoft.com/office/drawing/2010/main" Requires="a14">
+      <mc:AlternateContent xmlns:mc="http://schemas.openxmlformats.org/markup-compatibility/2006" xmlns:a14="http://schemas.microsoft.com/office/drawing/2010/main">
+        <mc:Choice Requires="a14">
           <p:sp>
             <p:nvSpPr>
               <p:cNvPr id="20" name="TextBox 19">
@@ -10066,6 +10090,7 @@
               </a:bodyPr>
               <a:lstStyle/>
               <a:p>
+                <a:pPr/>
                 <a14:m>
                   <m:oMathPara xmlns:m="http://schemas.openxmlformats.org/officeDocument/2006/math">
                     <m:oMathParaPr>
@@ -10089,7 +10114,7 @@
             </p:txBody>
           </p:sp>
         </mc:Choice>
-        <mc:Fallback>
+        <mc:Fallback xmlns="">
           <p:sp>
             <p:nvSpPr>
               <p:cNvPr id="20" name="TextBox 19">
@@ -10134,8 +10159,8 @@
           </p:sp>
         </mc:Fallback>
       </mc:AlternateContent>
-      <mc:AlternateContent xmlns:mc="http://schemas.openxmlformats.org/markup-compatibility/2006">
-        <mc:Choice xmlns:a14="http://schemas.microsoft.com/office/drawing/2010/main" Requires="a14">
+      <mc:AlternateContent xmlns:mc="http://schemas.openxmlformats.org/markup-compatibility/2006" xmlns:a14="http://schemas.microsoft.com/office/drawing/2010/main">
+        <mc:Choice Requires="a14">
           <p:sp>
             <p:nvSpPr>
               <p:cNvPr id="21" name="TextBox 20">
@@ -10164,6 +10189,7 @@
               </a:bodyPr>
               <a:lstStyle/>
               <a:p>
+                <a:pPr/>
                 <a14:m>
                   <m:oMathPara xmlns:m="http://schemas.openxmlformats.org/officeDocument/2006/math">
                     <m:oMathParaPr>
@@ -10199,7 +10225,7 @@
             </p:txBody>
           </p:sp>
         </mc:Choice>
-        <mc:Fallback>
+        <mc:Fallback xmlns="">
           <p:sp>
             <p:nvSpPr>
               <p:cNvPr id="21" name="TextBox 20">
@@ -10244,8 +10270,8 @@
           </p:sp>
         </mc:Fallback>
       </mc:AlternateContent>
-      <mc:AlternateContent xmlns:mc="http://schemas.openxmlformats.org/markup-compatibility/2006">
-        <mc:Choice xmlns:a14="http://schemas.microsoft.com/office/drawing/2010/main" Requires="a14">
+      <mc:AlternateContent xmlns:mc="http://schemas.openxmlformats.org/markup-compatibility/2006" xmlns:a14="http://schemas.microsoft.com/office/drawing/2010/main">
+        <mc:Choice Requires="a14">
           <p:sp>
             <p:nvSpPr>
               <p:cNvPr id="22" name="TextBox 21">
@@ -10274,6 +10300,7 @@
               </a:bodyPr>
               <a:lstStyle/>
               <a:p>
+                <a:pPr/>
                 <a14:m>
                   <m:oMathPara xmlns:m="http://schemas.openxmlformats.org/officeDocument/2006/math">
                     <m:oMathParaPr>
@@ -10463,7 +10490,7 @@
             </p:txBody>
           </p:sp>
         </mc:Choice>
-        <mc:Fallback>
+        <mc:Fallback xmlns="">
           <p:sp>
             <p:nvSpPr>
               <p:cNvPr id="22" name="TextBox 21">
@@ -10508,8 +10535,8 @@
           </p:sp>
         </mc:Fallback>
       </mc:AlternateContent>
-      <mc:AlternateContent xmlns:mc="http://schemas.openxmlformats.org/markup-compatibility/2006">
-        <mc:Choice xmlns:a14="http://schemas.microsoft.com/office/drawing/2010/main" Requires="a14">
+      <mc:AlternateContent xmlns:mc="http://schemas.openxmlformats.org/markup-compatibility/2006" xmlns:a14="http://schemas.microsoft.com/office/drawing/2010/main">
+        <mc:Choice Requires="a14">
           <p:sp>
             <p:nvSpPr>
               <p:cNvPr id="23" name="TextBox 22">
@@ -10538,6 +10565,7 @@
               </a:bodyPr>
               <a:lstStyle/>
               <a:p>
+                <a:pPr/>
                 <a14:m>
                   <m:oMathPara xmlns:m="http://schemas.openxmlformats.org/officeDocument/2006/math">
                     <m:oMathParaPr>
@@ -10727,7 +10755,7 @@
             </p:txBody>
           </p:sp>
         </mc:Choice>
-        <mc:Fallback>
+        <mc:Fallback xmlns="">
           <p:sp>
             <p:nvSpPr>
               <p:cNvPr id="23" name="TextBox 22">
@@ -10772,8 +10800,8 @@
           </p:sp>
         </mc:Fallback>
       </mc:AlternateContent>
-      <mc:AlternateContent xmlns:mc="http://schemas.openxmlformats.org/markup-compatibility/2006">
-        <mc:Choice xmlns:a14="http://schemas.microsoft.com/office/drawing/2010/main" Requires="a14">
+      <mc:AlternateContent xmlns:mc="http://schemas.openxmlformats.org/markup-compatibility/2006" xmlns:a14="http://schemas.microsoft.com/office/drawing/2010/main">
+        <mc:Choice Requires="a14">
           <p:sp>
             <p:nvSpPr>
               <p:cNvPr id="24" name="TextBox 23">
@@ -10802,6 +10830,7 @@
               </a:bodyPr>
               <a:lstStyle/>
               <a:p>
+                <a:pPr/>
                 <a14:m>
                   <m:oMathPara xmlns:m="http://schemas.openxmlformats.org/officeDocument/2006/math">
                     <m:oMathParaPr>
@@ -10825,7 +10854,7 @@
             </p:txBody>
           </p:sp>
         </mc:Choice>
-        <mc:Fallback>
+        <mc:Fallback xmlns="">
           <p:sp>
             <p:nvSpPr>
               <p:cNvPr id="24" name="TextBox 23">
@@ -10870,8 +10899,8 @@
           </p:sp>
         </mc:Fallback>
       </mc:AlternateContent>
-      <mc:AlternateContent xmlns:mc="http://schemas.openxmlformats.org/markup-compatibility/2006">
-        <mc:Choice xmlns:a14="http://schemas.microsoft.com/office/drawing/2010/main" Requires="a14">
+      <mc:AlternateContent xmlns:mc="http://schemas.openxmlformats.org/markup-compatibility/2006" xmlns:a14="http://schemas.microsoft.com/office/drawing/2010/main">
+        <mc:Choice Requires="a14">
           <p:sp>
             <p:nvSpPr>
               <p:cNvPr id="26" name="TextBox 25">
@@ -10985,7 +11014,7 @@
             </p:txBody>
           </p:sp>
         </mc:Choice>
-        <mc:Fallback>
+        <mc:Fallback xmlns="">
           <p:sp>
             <p:nvSpPr>
               <p:cNvPr id="26" name="TextBox 25">
@@ -11030,8 +11059,8 @@
           </p:sp>
         </mc:Fallback>
       </mc:AlternateContent>
-      <mc:AlternateContent xmlns:mc="http://schemas.openxmlformats.org/markup-compatibility/2006">
-        <mc:Choice xmlns:a14="http://schemas.microsoft.com/office/drawing/2010/main" Requires="a14">
+      <mc:AlternateContent xmlns:mc="http://schemas.openxmlformats.org/markup-compatibility/2006" xmlns:a14="http://schemas.microsoft.com/office/drawing/2010/main">
+        <mc:Choice Requires="a14">
           <p:sp>
             <p:nvSpPr>
               <p:cNvPr id="28" name="TextBox 27">
@@ -11173,7 +11202,7 @@
             </p:txBody>
           </p:sp>
         </mc:Choice>
-        <mc:Fallback>
+        <mc:Fallback xmlns="">
           <p:sp>
             <p:nvSpPr>
               <p:cNvPr id="28" name="TextBox 27">
@@ -11218,8 +11247,8 @@
           </p:sp>
         </mc:Fallback>
       </mc:AlternateContent>
-      <mc:AlternateContent xmlns:mc="http://schemas.openxmlformats.org/markup-compatibility/2006">
-        <mc:Choice xmlns:a14="http://schemas.microsoft.com/office/drawing/2010/main" Requires="a14">
+      <mc:AlternateContent xmlns:mc="http://schemas.openxmlformats.org/markup-compatibility/2006" xmlns:a14="http://schemas.microsoft.com/office/drawing/2010/main">
+        <mc:Choice Requires="a14">
           <p:sp>
             <p:nvSpPr>
               <p:cNvPr id="30" name="TextBox 29">
@@ -11319,7 +11348,7 @@
             </p:txBody>
           </p:sp>
         </mc:Choice>
-        <mc:Fallback>
+        <mc:Fallback xmlns="">
           <p:sp>
             <p:nvSpPr>
               <p:cNvPr id="30" name="TextBox 29">
@@ -11364,8 +11393,8 @@
           </p:sp>
         </mc:Fallback>
       </mc:AlternateContent>
-      <mc:AlternateContent xmlns:mc="http://schemas.openxmlformats.org/markup-compatibility/2006">
-        <mc:Choice xmlns:a14="http://schemas.microsoft.com/office/drawing/2010/main" Requires="a14">
+      <mc:AlternateContent xmlns:mc="http://schemas.openxmlformats.org/markup-compatibility/2006" xmlns:a14="http://schemas.microsoft.com/office/drawing/2010/main">
+        <mc:Choice Requires="a14">
           <p:sp>
             <p:nvSpPr>
               <p:cNvPr id="143" name="TextBox 142">
@@ -11458,7 +11487,7 @@
             </p:txBody>
           </p:sp>
         </mc:Choice>
-        <mc:Fallback>
+        <mc:Fallback xmlns="">
           <p:sp>
             <p:nvSpPr>
               <p:cNvPr id="143" name="TextBox 142">
@@ -11503,8 +11532,8 @@
           </p:sp>
         </mc:Fallback>
       </mc:AlternateContent>
-      <mc:AlternateContent xmlns:mc="http://schemas.openxmlformats.org/markup-compatibility/2006">
-        <mc:Choice xmlns:a14="http://schemas.microsoft.com/office/drawing/2010/main" Requires="a14">
+      <mc:AlternateContent xmlns:mc="http://schemas.openxmlformats.org/markup-compatibility/2006" xmlns:a14="http://schemas.microsoft.com/office/drawing/2010/main">
+        <mc:Choice Requires="a14">
           <p:sp>
             <p:nvSpPr>
               <p:cNvPr id="371" name="TextBox 370">
@@ -11533,6 +11562,7 @@
               </a:bodyPr>
               <a:lstStyle/>
               <a:p>
+                <a:pPr/>
                 <a14:m>
                   <m:oMathPara xmlns:m="http://schemas.openxmlformats.org/officeDocument/2006/math">
                     <m:oMathParaPr>
@@ -11624,7 +11654,7 @@
             </p:txBody>
           </p:sp>
         </mc:Choice>
-        <mc:Fallback>
+        <mc:Fallback xmlns="">
           <p:sp>
             <p:nvSpPr>
               <p:cNvPr id="371" name="TextBox 370">
@@ -11669,8 +11699,8 @@
           </p:sp>
         </mc:Fallback>
       </mc:AlternateContent>
-      <mc:AlternateContent xmlns:mc="http://schemas.openxmlformats.org/markup-compatibility/2006">
-        <mc:Choice xmlns:a14="http://schemas.microsoft.com/office/drawing/2010/main" Requires="a14">
+      <mc:AlternateContent xmlns:mc="http://schemas.openxmlformats.org/markup-compatibility/2006" xmlns:a14="http://schemas.microsoft.com/office/drawing/2010/main">
+        <mc:Choice Requires="a14">
           <p:sp>
             <p:nvSpPr>
               <p:cNvPr id="372" name="TextBox 371">
@@ -11699,6 +11729,7 @@
               </a:bodyPr>
               <a:lstStyle/>
               <a:p>
+                <a:pPr/>
                 <a14:m>
                   <m:oMathPara xmlns:m="http://schemas.openxmlformats.org/officeDocument/2006/math">
                     <m:oMathParaPr>
@@ -11790,7 +11821,7 @@
             </p:txBody>
           </p:sp>
         </mc:Choice>
-        <mc:Fallback>
+        <mc:Fallback xmlns="">
           <p:sp>
             <p:nvSpPr>
               <p:cNvPr id="372" name="TextBox 371">
@@ -11835,8 +11866,8 @@
           </p:sp>
         </mc:Fallback>
       </mc:AlternateContent>
-      <mc:AlternateContent xmlns:mc="http://schemas.openxmlformats.org/markup-compatibility/2006">
-        <mc:Choice xmlns:a14="http://schemas.microsoft.com/office/drawing/2010/main" Requires="a14">
+      <mc:AlternateContent xmlns:mc="http://schemas.openxmlformats.org/markup-compatibility/2006" xmlns:a14="http://schemas.microsoft.com/office/drawing/2010/main">
+        <mc:Choice Requires="a14">
           <p:sp>
             <p:nvSpPr>
               <p:cNvPr id="373" name="TextBox 372">
@@ -11865,6 +11896,7 @@
               </a:bodyPr>
               <a:lstStyle/>
               <a:p>
+                <a:pPr/>
                 <a14:m>
                   <m:oMathPara xmlns:m="http://schemas.openxmlformats.org/officeDocument/2006/math">
                     <m:oMathParaPr>
@@ -11916,7 +11948,7 @@
             </p:txBody>
           </p:sp>
         </mc:Choice>
-        <mc:Fallback>
+        <mc:Fallback xmlns="">
           <p:sp>
             <p:nvSpPr>
               <p:cNvPr id="373" name="TextBox 372">
@@ -12620,7 +12652,7 @@
 </file>
 
 <file path=ppt/slides/slide5.xml><?xml version="1.0" encoding="utf-8"?>
-<p:sld xmlns:a="http://schemas.openxmlformats.org/drawingml/2006/main" xmlns:r="http://schemas.openxmlformats.org/officeDocument/2006/relationships" xmlns:p="http://schemas.openxmlformats.org/presentationml/2006/main">
+<p:sld xmlns:a="http://schemas.openxmlformats.org/drawingml/2006/main" xmlns:r="http://schemas.openxmlformats.org/officeDocument/2006/relationships" xmlns:p="http://schemas.openxmlformats.org/presentationml/2006/main" show="0">
   <p:cSld>
     <p:spTree>
       <p:nvGrpSpPr>
@@ -15593,6 +15625,174 @@
             <a:r>
               <a:rPr lang="hu-HU" dirty="0" err="1"/>
               <a:t>Predict</a:t>
+            </a:r>
+            <a:endParaRPr lang="en-US" dirty="0"/>
+          </a:p>
+        </p:txBody>
+      </p:sp>
+      <p:sp>
+        <p:nvSpPr>
+          <p:cNvPr id="39" name="Rectangle 38">
+            <a:extLst>
+              <a:ext uri="{FF2B5EF4-FFF2-40B4-BE49-F238E27FC236}">
+                <a16:creationId xmlns:a16="http://schemas.microsoft.com/office/drawing/2014/main" id="{636F2F68-8FAF-4246-84B2-187D9350BA29}"/>
+              </a:ext>
+            </a:extLst>
+          </p:cNvPr>
+          <p:cNvSpPr/>
+          <p:nvPr/>
+        </p:nvSpPr>
+        <p:spPr>
+          <a:xfrm>
+            <a:off x="2650361" y="512205"/>
+            <a:ext cx="1090311" cy="332909"/>
+          </a:xfrm>
+          <a:prstGeom prst="rect">
+            <a:avLst/>
+          </a:prstGeom>
+          <a:noFill/>
+          <a:ln w="19050">
+            <a:solidFill>
+              <a:schemeClr val="tx1"/>
+            </a:solidFill>
+          </a:ln>
+        </p:spPr>
+        <p:style>
+          <a:lnRef idx="2">
+            <a:schemeClr val="accent1">
+              <a:shade val="50000"/>
+            </a:schemeClr>
+          </a:lnRef>
+          <a:fillRef idx="1">
+            <a:schemeClr val="accent1"/>
+          </a:fillRef>
+          <a:effectRef idx="0">
+            <a:schemeClr val="accent1"/>
+          </a:effectRef>
+          <a:fontRef idx="minor">
+            <a:schemeClr val="lt1"/>
+          </a:fontRef>
+        </p:style>
+        <p:txBody>
+          <a:bodyPr rtlCol="0" anchor="ctr"/>
+          <a:lstStyle/>
+          <a:p>
+            <a:pPr algn="ctr"/>
+            <a:r>
+              <a:rPr lang="hu-HU" dirty="0" err="1"/>
+              <a:t>LinearR</a:t>
+            </a:r>
+            <a:endParaRPr lang="en-US" dirty="0"/>
+          </a:p>
+        </p:txBody>
+      </p:sp>
+      <p:sp>
+        <p:nvSpPr>
+          <p:cNvPr id="40" name="Rectangle 39">
+            <a:extLst>
+              <a:ext uri="{FF2B5EF4-FFF2-40B4-BE49-F238E27FC236}">
+                <a16:creationId xmlns:a16="http://schemas.microsoft.com/office/drawing/2014/main" id="{63EC2B91-3F22-41DF-B2F0-C7264EADF69D}"/>
+              </a:ext>
+            </a:extLst>
+          </p:cNvPr>
+          <p:cNvSpPr/>
+          <p:nvPr/>
+        </p:nvSpPr>
+        <p:spPr>
+          <a:xfrm>
+            <a:off x="3849112" y="525286"/>
+            <a:ext cx="1090311" cy="332909"/>
+          </a:xfrm>
+          <a:prstGeom prst="rect">
+            <a:avLst/>
+          </a:prstGeom>
+          <a:noFill/>
+          <a:ln w="19050">
+            <a:solidFill>
+              <a:srgbClr val="FFC000"/>
+            </a:solidFill>
+          </a:ln>
+        </p:spPr>
+        <p:style>
+          <a:lnRef idx="2">
+            <a:schemeClr val="accent1">
+              <a:shade val="50000"/>
+            </a:schemeClr>
+          </a:lnRef>
+          <a:fillRef idx="1">
+            <a:schemeClr val="accent1"/>
+          </a:fillRef>
+          <a:effectRef idx="0">
+            <a:schemeClr val="accent1"/>
+          </a:effectRef>
+          <a:fontRef idx="minor">
+            <a:schemeClr val="lt1"/>
+          </a:fontRef>
+        </p:style>
+        <p:txBody>
+          <a:bodyPr rtlCol="0" anchor="ctr"/>
+          <a:lstStyle/>
+          <a:p>
+            <a:pPr algn="ctr"/>
+            <a:r>
+              <a:rPr lang="hu-HU" dirty="0"/>
+              <a:t>ANN</a:t>
+            </a:r>
+            <a:endParaRPr lang="en-US" dirty="0"/>
+          </a:p>
+        </p:txBody>
+      </p:sp>
+      <p:sp>
+        <p:nvSpPr>
+          <p:cNvPr id="41" name="Rectangle 40">
+            <a:extLst>
+              <a:ext uri="{FF2B5EF4-FFF2-40B4-BE49-F238E27FC236}">
+                <a16:creationId xmlns:a16="http://schemas.microsoft.com/office/drawing/2014/main" id="{0D2991A0-56EB-4611-BE59-A2EB5ADF9F79}"/>
+              </a:ext>
+            </a:extLst>
+          </p:cNvPr>
+          <p:cNvSpPr/>
+          <p:nvPr/>
+        </p:nvSpPr>
+        <p:spPr>
+          <a:xfrm>
+            <a:off x="5005689" y="525286"/>
+            <a:ext cx="1090311" cy="332909"/>
+          </a:xfrm>
+          <a:prstGeom prst="rect">
+            <a:avLst/>
+          </a:prstGeom>
+          <a:noFill/>
+          <a:ln w="19050">
+            <a:solidFill>
+              <a:schemeClr val="tx1"/>
+            </a:solidFill>
+          </a:ln>
+        </p:spPr>
+        <p:style>
+          <a:lnRef idx="2">
+            <a:schemeClr val="accent1">
+              <a:shade val="50000"/>
+            </a:schemeClr>
+          </a:lnRef>
+          <a:fillRef idx="1">
+            <a:schemeClr val="accent1"/>
+          </a:fillRef>
+          <a:effectRef idx="0">
+            <a:schemeClr val="accent1"/>
+          </a:effectRef>
+          <a:fontRef idx="minor">
+            <a:schemeClr val="lt1"/>
+          </a:fontRef>
+        </p:style>
+        <p:txBody>
+          <a:bodyPr rtlCol="0" anchor="ctr"/>
+          <a:lstStyle/>
+          <a:p>
+            <a:pPr algn="ctr"/>
+            <a:r>
+              <a:rPr lang="hu-HU" dirty="0" err="1"/>
+              <a:t>Playgrd</a:t>
             </a:r>
             <a:endParaRPr lang="en-US" dirty="0"/>
           </a:p>

</xml_diff>

<commit_message>
Unhide hidden slides in Backpropagation.pptx
</commit_message>
<xml_diff>
--- a/Presentation/evoShapeRecognizer/Session03/Backpropagation.pptx
+++ b/Presentation/evoShapeRecognizer/Session03/Backpropagation.pptx
@@ -202,7 +202,7 @@
           <a:p>
             <a:fld id="{88F65366-2642-4E54-AEBB-BDA3F27B4BEB}" type="datetimeFigureOut">
               <a:rPr lang="en-US" smtClean="0"/>
-              <a:t>4/22/2022</a:t>
+              <a:t>5/5/2022</a:t>
             </a:fld>
             <a:endParaRPr lang="en-US"/>
           </a:p>
@@ -942,7 +942,7 @@
           <a:p>
             <a:fld id="{6F434C57-7570-40AD-9CC2-DD9EBD30B3BB}" type="datetimeFigureOut">
               <a:rPr lang="en-US" smtClean="0"/>
-              <a:t>4/22/2022</a:t>
+              <a:t>5/5/2022</a:t>
             </a:fld>
             <a:endParaRPr lang="en-US"/>
           </a:p>
@@ -1112,7 +1112,7 @@
           <a:p>
             <a:fld id="{6F434C57-7570-40AD-9CC2-DD9EBD30B3BB}" type="datetimeFigureOut">
               <a:rPr lang="en-US" smtClean="0"/>
-              <a:t>4/22/2022</a:t>
+              <a:t>5/5/2022</a:t>
             </a:fld>
             <a:endParaRPr lang="en-US"/>
           </a:p>
@@ -1292,7 +1292,7 @@
           <a:p>
             <a:fld id="{6F434C57-7570-40AD-9CC2-DD9EBD30B3BB}" type="datetimeFigureOut">
               <a:rPr lang="en-US" smtClean="0"/>
-              <a:t>4/22/2022</a:t>
+              <a:t>5/5/2022</a:t>
             </a:fld>
             <a:endParaRPr lang="en-US"/>
           </a:p>
@@ -1462,7 +1462,7 @@
           <a:p>
             <a:fld id="{6F434C57-7570-40AD-9CC2-DD9EBD30B3BB}" type="datetimeFigureOut">
               <a:rPr lang="en-US" smtClean="0"/>
-              <a:t>4/22/2022</a:t>
+              <a:t>5/5/2022</a:t>
             </a:fld>
             <a:endParaRPr lang="en-US"/>
           </a:p>
@@ -1708,7 +1708,7 @@
           <a:p>
             <a:fld id="{6F434C57-7570-40AD-9CC2-DD9EBD30B3BB}" type="datetimeFigureOut">
               <a:rPr lang="en-US" smtClean="0"/>
-              <a:t>4/22/2022</a:t>
+              <a:t>5/5/2022</a:t>
             </a:fld>
             <a:endParaRPr lang="en-US"/>
           </a:p>
@@ -1940,7 +1940,7 @@
           <a:p>
             <a:fld id="{6F434C57-7570-40AD-9CC2-DD9EBD30B3BB}" type="datetimeFigureOut">
               <a:rPr lang="en-US" smtClean="0"/>
-              <a:t>4/22/2022</a:t>
+              <a:t>5/5/2022</a:t>
             </a:fld>
             <a:endParaRPr lang="en-US"/>
           </a:p>
@@ -2307,7 +2307,7 @@
           <a:p>
             <a:fld id="{6F434C57-7570-40AD-9CC2-DD9EBD30B3BB}" type="datetimeFigureOut">
               <a:rPr lang="en-US" smtClean="0"/>
-              <a:t>4/22/2022</a:t>
+              <a:t>5/5/2022</a:t>
             </a:fld>
             <a:endParaRPr lang="en-US"/>
           </a:p>
@@ -2425,7 +2425,7 @@
           <a:p>
             <a:fld id="{6F434C57-7570-40AD-9CC2-DD9EBD30B3BB}" type="datetimeFigureOut">
               <a:rPr lang="en-US" smtClean="0"/>
-              <a:t>4/22/2022</a:t>
+              <a:t>5/5/2022</a:t>
             </a:fld>
             <a:endParaRPr lang="en-US"/>
           </a:p>
@@ -2520,7 +2520,7 @@
           <a:p>
             <a:fld id="{6F434C57-7570-40AD-9CC2-DD9EBD30B3BB}" type="datetimeFigureOut">
               <a:rPr lang="en-US" smtClean="0"/>
-              <a:t>4/22/2022</a:t>
+              <a:t>5/5/2022</a:t>
             </a:fld>
             <a:endParaRPr lang="en-US"/>
           </a:p>
@@ -2797,7 +2797,7 @@
           <a:p>
             <a:fld id="{6F434C57-7570-40AD-9CC2-DD9EBD30B3BB}" type="datetimeFigureOut">
               <a:rPr lang="en-US" smtClean="0"/>
-              <a:t>4/22/2022</a:t>
+              <a:t>5/5/2022</a:t>
             </a:fld>
             <a:endParaRPr lang="en-US"/>
           </a:p>
@@ -3054,7 +3054,7 @@
           <a:p>
             <a:fld id="{6F434C57-7570-40AD-9CC2-DD9EBD30B3BB}" type="datetimeFigureOut">
               <a:rPr lang="en-US" smtClean="0"/>
-              <a:t>4/22/2022</a:t>
+              <a:t>5/5/2022</a:t>
             </a:fld>
             <a:endParaRPr lang="en-US"/>
           </a:p>
@@ -3267,7 +3267,7 @@
           <a:p>
             <a:fld id="{6F434C57-7570-40AD-9CC2-DD9EBD30B3BB}" type="datetimeFigureOut">
               <a:rPr lang="en-US" smtClean="0"/>
-              <a:t>4/22/2022</a:t>
+              <a:t>5/5/2022</a:t>
             </a:fld>
             <a:endParaRPr lang="en-US"/>
           </a:p>
@@ -3656,7 +3656,7 @@
 </file>
 
 <file path=ppt/slides/slide1.xml><?xml version="1.0" encoding="utf-8"?>
-<p:sld xmlns:a="http://schemas.openxmlformats.org/drawingml/2006/main" xmlns:r="http://schemas.openxmlformats.org/officeDocument/2006/relationships" xmlns:p="http://schemas.openxmlformats.org/presentationml/2006/main" show="0">
+<p:sld xmlns:a="http://schemas.openxmlformats.org/drawingml/2006/main" xmlns:r="http://schemas.openxmlformats.org/officeDocument/2006/relationships" xmlns:p="http://schemas.openxmlformats.org/presentationml/2006/main">
   <p:cSld>
     <p:spTree>
       <p:nvGrpSpPr>
@@ -3746,7 +3746,7 @@
 </file>
 
 <file path=ppt/slides/slide2.xml><?xml version="1.0" encoding="utf-8"?>
-<p:sld xmlns:a="http://schemas.openxmlformats.org/drawingml/2006/main" xmlns:r="http://schemas.openxmlformats.org/officeDocument/2006/relationships" xmlns:p="http://schemas.openxmlformats.org/presentationml/2006/main" show="0">
+<p:sld xmlns:a="http://schemas.openxmlformats.org/drawingml/2006/main" xmlns:r="http://schemas.openxmlformats.org/officeDocument/2006/relationships" xmlns:p="http://schemas.openxmlformats.org/presentationml/2006/main">
   <p:cSld>
     <p:spTree>
       <p:nvGrpSpPr>
@@ -5178,7 +5178,7 @@
 </file>
 
 <file path=ppt/slides/slide3.xml><?xml version="1.0" encoding="utf-8"?>
-<p:sld xmlns:a="http://schemas.openxmlformats.org/drawingml/2006/main" xmlns:r="http://schemas.openxmlformats.org/officeDocument/2006/relationships" xmlns:p="http://schemas.openxmlformats.org/presentationml/2006/main" show="0">
+<p:sld xmlns:a="http://schemas.openxmlformats.org/drawingml/2006/main" xmlns:r="http://schemas.openxmlformats.org/officeDocument/2006/relationships" xmlns:p="http://schemas.openxmlformats.org/presentationml/2006/main">
   <p:cSld>
     <p:spTree>
       <p:nvGrpSpPr>
@@ -7652,7 +7652,7 @@
                                           </p:stCondLst>
                                         </p:cTn>
                                         <p:tgtEl>
-                                          <p:spTgt spid="55"/>
+                                          <p:spTgt spid="39"/>
                                         </p:tgtEl>
                                         <p:attrNameLst>
                                           <p:attrName>style.visibility</p:attrName>
@@ -7697,7 +7697,7 @@
                                           </p:stCondLst>
                                         </p:cTn>
                                         <p:tgtEl>
-                                          <p:spTgt spid="46"/>
+                                          <p:spTgt spid="44"/>
                                         </p:tgtEl>
                                         <p:attrNameLst>
                                           <p:attrName>style.visibility</p:attrName>
@@ -7742,7 +7742,7 @@
                                           </p:stCondLst>
                                         </p:cTn>
                                         <p:tgtEl>
-                                          <p:spTgt spid="44"/>
+                                          <p:spTgt spid="46"/>
                                         </p:tgtEl>
                                         <p:attrNameLst>
                                           <p:attrName>style.visibility</p:attrName>
@@ -7787,7 +7787,7 @@
                                           </p:stCondLst>
                                         </p:cTn>
                                         <p:tgtEl>
-                                          <p:spTgt spid="39"/>
+                                          <p:spTgt spid="55"/>
                                         </p:tgtEl>
                                         <p:attrNameLst>
                                           <p:attrName>style.visibility</p:attrName>
@@ -8114,7 +8114,7 @@
 </file>
 
 <file path=ppt/slides/slide4.xml><?xml version="1.0" encoding="utf-8"?>
-<p:sld xmlns:a="http://schemas.openxmlformats.org/drawingml/2006/main" xmlns:r="http://schemas.openxmlformats.org/officeDocument/2006/relationships" xmlns:p="http://schemas.openxmlformats.org/presentationml/2006/main" show="0">
+<p:sld xmlns:a="http://schemas.openxmlformats.org/drawingml/2006/main" xmlns:r="http://schemas.openxmlformats.org/officeDocument/2006/relationships" xmlns:p="http://schemas.openxmlformats.org/presentationml/2006/main">
   <p:cSld>
     <p:spTree>
       <p:nvGrpSpPr>
@@ -12652,7 +12652,7 @@
 </file>
 
 <file path=ppt/slides/slide5.xml><?xml version="1.0" encoding="utf-8"?>
-<p:sld xmlns:a="http://schemas.openxmlformats.org/drawingml/2006/main" xmlns:r="http://schemas.openxmlformats.org/officeDocument/2006/relationships" xmlns:p="http://schemas.openxmlformats.org/presentationml/2006/main" show="0">
+<p:sld xmlns:a="http://schemas.openxmlformats.org/drawingml/2006/main" xmlns:r="http://schemas.openxmlformats.org/officeDocument/2006/relationships" xmlns:p="http://schemas.openxmlformats.org/presentationml/2006/main">
   <p:cSld>
     <p:spTree>
       <p:nvGrpSpPr>

</xml_diff>

<commit_message>
Revert "Merge pull request #77 from evoRegression/main"
This reverts commit 98f280e9b26f378ca3b2e0ddd606bebba3479f5a, reversing
changes made to 25dcf161f8d9de5967400da18a9823dd997125e3.
</commit_message>
<xml_diff>
--- a/Presentation/evoShapeRecognizer/Session03/Backpropagation.pptx
+++ b/Presentation/evoShapeRecognizer/Session03/Backpropagation.pptx
@@ -202,7 +202,7 @@
           <a:p>
             <a:fld id="{88F65366-2642-4E54-AEBB-BDA3F27B4BEB}" type="datetimeFigureOut">
               <a:rPr lang="en-US" smtClean="0"/>
-              <a:t>5/5/2022</a:t>
+              <a:t>4/22/2022</a:t>
             </a:fld>
             <a:endParaRPr lang="en-US"/>
           </a:p>
@@ -942,7 +942,7 @@
           <a:p>
             <a:fld id="{6F434C57-7570-40AD-9CC2-DD9EBD30B3BB}" type="datetimeFigureOut">
               <a:rPr lang="en-US" smtClean="0"/>
-              <a:t>5/5/2022</a:t>
+              <a:t>4/22/2022</a:t>
             </a:fld>
             <a:endParaRPr lang="en-US"/>
           </a:p>
@@ -1112,7 +1112,7 @@
           <a:p>
             <a:fld id="{6F434C57-7570-40AD-9CC2-DD9EBD30B3BB}" type="datetimeFigureOut">
               <a:rPr lang="en-US" smtClean="0"/>
-              <a:t>5/5/2022</a:t>
+              <a:t>4/22/2022</a:t>
             </a:fld>
             <a:endParaRPr lang="en-US"/>
           </a:p>
@@ -1292,7 +1292,7 @@
           <a:p>
             <a:fld id="{6F434C57-7570-40AD-9CC2-DD9EBD30B3BB}" type="datetimeFigureOut">
               <a:rPr lang="en-US" smtClean="0"/>
-              <a:t>5/5/2022</a:t>
+              <a:t>4/22/2022</a:t>
             </a:fld>
             <a:endParaRPr lang="en-US"/>
           </a:p>
@@ -1462,7 +1462,7 @@
           <a:p>
             <a:fld id="{6F434C57-7570-40AD-9CC2-DD9EBD30B3BB}" type="datetimeFigureOut">
               <a:rPr lang="en-US" smtClean="0"/>
-              <a:t>5/5/2022</a:t>
+              <a:t>4/22/2022</a:t>
             </a:fld>
             <a:endParaRPr lang="en-US"/>
           </a:p>
@@ -1708,7 +1708,7 @@
           <a:p>
             <a:fld id="{6F434C57-7570-40AD-9CC2-DD9EBD30B3BB}" type="datetimeFigureOut">
               <a:rPr lang="en-US" smtClean="0"/>
-              <a:t>5/5/2022</a:t>
+              <a:t>4/22/2022</a:t>
             </a:fld>
             <a:endParaRPr lang="en-US"/>
           </a:p>
@@ -1940,7 +1940,7 @@
           <a:p>
             <a:fld id="{6F434C57-7570-40AD-9CC2-DD9EBD30B3BB}" type="datetimeFigureOut">
               <a:rPr lang="en-US" smtClean="0"/>
-              <a:t>5/5/2022</a:t>
+              <a:t>4/22/2022</a:t>
             </a:fld>
             <a:endParaRPr lang="en-US"/>
           </a:p>
@@ -2307,7 +2307,7 @@
           <a:p>
             <a:fld id="{6F434C57-7570-40AD-9CC2-DD9EBD30B3BB}" type="datetimeFigureOut">
               <a:rPr lang="en-US" smtClean="0"/>
-              <a:t>5/5/2022</a:t>
+              <a:t>4/22/2022</a:t>
             </a:fld>
             <a:endParaRPr lang="en-US"/>
           </a:p>
@@ -2425,7 +2425,7 @@
           <a:p>
             <a:fld id="{6F434C57-7570-40AD-9CC2-DD9EBD30B3BB}" type="datetimeFigureOut">
               <a:rPr lang="en-US" smtClean="0"/>
-              <a:t>5/5/2022</a:t>
+              <a:t>4/22/2022</a:t>
             </a:fld>
             <a:endParaRPr lang="en-US"/>
           </a:p>
@@ -2520,7 +2520,7 @@
           <a:p>
             <a:fld id="{6F434C57-7570-40AD-9CC2-DD9EBD30B3BB}" type="datetimeFigureOut">
               <a:rPr lang="en-US" smtClean="0"/>
-              <a:t>5/5/2022</a:t>
+              <a:t>4/22/2022</a:t>
             </a:fld>
             <a:endParaRPr lang="en-US"/>
           </a:p>
@@ -2797,7 +2797,7 @@
           <a:p>
             <a:fld id="{6F434C57-7570-40AD-9CC2-DD9EBD30B3BB}" type="datetimeFigureOut">
               <a:rPr lang="en-US" smtClean="0"/>
-              <a:t>5/5/2022</a:t>
+              <a:t>4/22/2022</a:t>
             </a:fld>
             <a:endParaRPr lang="en-US"/>
           </a:p>
@@ -3054,7 +3054,7 @@
           <a:p>
             <a:fld id="{6F434C57-7570-40AD-9CC2-DD9EBD30B3BB}" type="datetimeFigureOut">
               <a:rPr lang="en-US" smtClean="0"/>
-              <a:t>5/5/2022</a:t>
+              <a:t>4/22/2022</a:t>
             </a:fld>
             <a:endParaRPr lang="en-US"/>
           </a:p>
@@ -3267,7 +3267,7 @@
           <a:p>
             <a:fld id="{6F434C57-7570-40AD-9CC2-DD9EBD30B3BB}" type="datetimeFigureOut">
               <a:rPr lang="en-US" smtClean="0"/>
-              <a:t>5/5/2022</a:t>
+              <a:t>4/22/2022</a:t>
             </a:fld>
             <a:endParaRPr lang="en-US"/>
           </a:p>
@@ -3656,7 +3656,7 @@
 </file>
 
 <file path=ppt/slides/slide1.xml><?xml version="1.0" encoding="utf-8"?>
-<p:sld xmlns:a="http://schemas.openxmlformats.org/drawingml/2006/main" xmlns:r="http://schemas.openxmlformats.org/officeDocument/2006/relationships" xmlns:p="http://schemas.openxmlformats.org/presentationml/2006/main">
+<p:sld xmlns:a="http://schemas.openxmlformats.org/drawingml/2006/main" xmlns:r="http://schemas.openxmlformats.org/officeDocument/2006/relationships" xmlns:p="http://schemas.openxmlformats.org/presentationml/2006/main" show="0">
   <p:cSld>
     <p:spTree>
       <p:nvGrpSpPr>
@@ -3746,7 +3746,7 @@
 </file>
 
 <file path=ppt/slides/slide2.xml><?xml version="1.0" encoding="utf-8"?>
-<p:sld xmlns:a="http://schemas.openxmlformats.org/drawingml/2006/main" xmlns:r="http://schemas.openxmlformats.org/officeDocument/2006/relationships" xmlns:p="http://schemas.openxmlformats.org/presentationml/2006/main">
+<p:sld xmlns:a="http://schemas.openxmlformats.org/drawingml/2006/main" xmlns:r="http://schemas.openxmlformats.org/officeDocument/2006/relationships" xmlns:p="http://schemas.openxmlformats.org/presentationml/2006/main" show="0">
   <p:cSld>
     <p:spTree>
       <p:nvGrpSpPr>
@@ -5178,7 +5178,7 @@
 </file>
 
 <file path=ppt/slides/slide3.xml><?xml version="1.0" encoding="utf-8"?>
-<p:sld xmlns:a="http://schemas.openxmlformats.org/drawingml/2006/main" xmlns:r="http://schemas.openxmlformats.org/officeDocument/2006/relationships" xmlns:p="http://schemas.openxmlformats.org/presentationml/2006/main">
+<p:sld xmlns:a="http://schemas.openxmlformats.org/drawingml/2006/main" xmlns:r="http://schemas.openxmlformats.org/officeDocument/2006/relationships" xmlns:p="http://schemas.openxmlformats.org/presentationml/2006/main" show="0">
   <p:cSld>
     <p:spTree>
       <p:nvGrpSpPr>
@@ -7652,7 +7652,7 @@
                                           </p:stCondLst>
                                         </p:cTn>
                                         <p:tgtEl>
-                                          <p:spTgt spid="39"/>
+                                          <p:spTgt spid="55"/>
                                         </p:tgtEl>
                                         <p:attrNameLst>
                                           <p:attrName>style.visibility</p:attrName>
@@ -7697,7 +7697,7 @@
                                           </p:stCondLst>
                                         </p:cTn>
                                         <p:tgtEl>
-                                          <p:spTgt spid="44"/>
+                                          <p:spTgt spid="46"/>
                                         </p:tgtEl>
                                         <p:attrNameLst>
                                           <p:attrName>style.visibility</p:attrName>
@@ -7742,7 +7742,7 @@
                                           </p:stCondLst>
                                         </p:cTn>
                                         <p:tgtEl>
-                                          <p:spTgt spid="46"/>
+                                          <p:spTgt spid="44"/>
                                         </p:tgtEl>
                                         <p:attrNameLst>
                                           <p:attrName>style.visibility</p:attrName>
@@ -7787,7 +7787,7 @@
                                           </p:stCondLst>
                                         </p:cTn>
                                         <p:tgtEl>
-                                          <p:spTgt spid="55"/>
+                                          <p:spTgt spid="39"/>
                                         </p:tgtEl>
                                         <p:attrNameLst>
                                           <p:attrName>style.visibility</p:attrName>
@@ -8114,7 +8114,7 @@
 </file>
 
 <file path=ppt/slides/slide4.xml><?xml version="1.0" encoding="utf-8"?>
-<p:sld xmlns:a="http://schemas.openxmlformats.org/drawingml/2006/main" xmlns:r="http://schemas.openxmlformats.org/officeDocument/2006/relationships" xmlns:p="http://schemas.openxmlformats.org/presentationml/2006/main">
+<p:sld xmlns:a="http://schemas.openxmlformats.org/drawingml/2006/main" xmlns:r="http://schemas.openxmlformats.org/officeDocument/2006/relationships" xmlns:p="http://schemas.openxmlformats.org/presentationml/2006/main" show="0">
   <p:cSld>
     <p:spTree>
       <p:nvGrpSpPr>
@@ -12652,7 +12652,7 @@
 </file>
 
 <file path=ppt/slides/slide5.xml><?xml version="1.0" encoding="utf-8"?>
-<p:sld xmlns:a="http://schemas.openxmlformats.org/drawingml/2006/main" xmlns:r="http://schemas.openxmlformats.org/officeDocument/2006/relationships" xmlns:p="http://schemas.openxmlformats.org/presentationml/2006/main">
+<p:sld xmlns:a="http://schemas.openxmlformats.org/drawingml/2006/main" xmlns:r="http://schemas.openxmlformats.org/officeDocument/2006/relationships" xmlns:p="http://schemas.openxmlformats.org/presentationml/2006/main" show="0">
   <p:cSld>
     <p:spTree>
       <p:nvGrpSpPr>

</xml_diff>

<commit_message>
Commit back the reverted changeset.
</commit_message>
<xml_diff>
--- a/Presentation/evoShapeRecognizer/Session03/Backpropagation.pptx
+++ b/Presentation/evoShapeRecognizer/Session03/Backpropagation.pptx
@@ -202,7 +202,7 @@
           <a:p>
             <a:fld id="{88F65366-2642-4E54-AEBB-BDA3F27B4BEB}" type="datetimeFigureOut">
               <a:rPr lang="en-US" smtClean="0"/>
-              <a:t>4/22/2022</a:t>
+              <a:t>5/5/2022</a:t>
             </a:fld>
             <a:endParaRPr lang="en-US"/>
           </a:p>
@@ -942,7 +942,7 @@
           <a:p>
             <a:fld id="{6F434C57-7570-40AD-9CC2-DD9EBD30B3BB}" type="datetimeFigureOut">
               <a:rPr lang="en-US" smtClean="0"/>
-              <a:t>4/22/2022</a:t>
+              <a:t>5/5/2022</a:t>
             </a:fld>
             <a:endParaRPr lang="en-US"/>
           </a:p>
@@ -1112,7 +1112,7 @@
           <a:p>
             <a:fld id="{6F434C57-7570-40AD-9CC2-DD9EBD30B3BB}" type="datetimeFigureOut">
               <a:rPr lang="en-US" smtClean="0"/>
-              <a:t>4/22/2022</a:t>
+              <a:t>5/5/2022</a:t>
             </a:fld>
             <a:endParaRPr lang="en-US"/>
           </a:p>
@@ -1292,7 +1292,7 @@
           <a:p>
             <a:fld id="{6F434C57-7570-40AD-9CC2-DD9EBD30B3BB}" type="datetimeFigureOut">
               <a:rPr lang="en-US" smtClean="0"/>
-              <a:t>4/22/2022</a:t>
+              <a:t>5/5/2022</a:t>
             </a:fld>
             <a:endParaRPr lang="en-US"/>
           </a:p>
@@ -1462,7 +1462,7 @@
           <a:p>
             <a:fld id="{6F434C57-7570-40AD-9CC2-DD9EBD30B3BB}" type="datetimeFigureOut">
               <a:rPr lang="en-US" smtClean="0"/>
-              <a:t>4/22/2022</a:t>
+              <a:t>5/5/2022</a:t>
             </a:fld>
             <a:endParaRPr lang="en-US"/>
           </a:p>
@@ -1708,7 +1708,7 @@
           <a:p>
             <a:fld id="{6F434C57-7570-40AD-9CC2-DD9EBD30B3BB}" type="datetimeFigureOut">
               <a:rPr lang="en-US" smtClean="0"/>
-              <a:t>4/22/2022</a:t>
+              <a:t>5/5/2022</a:t>
             </a:fld>
             <a:endParaRPr lang="en-US"/>
           </a:p>
@@ -1940,7 +1940,7 @@
           <a:p>
             <a:fld id="{6F434C57-7570-40AD-9CC2-DD9EBD30B3BB}" type="datetimeFigureOut">
               <a:rPr lang="en-US" smtClean="0"/>
-              <a:t>4/22/2022</a:t>
+              <a:t>5/5/2022</a:t>
             </a:fld>
             <a:endParaRPr lang="en-US"/>
           </a:p>
@@ -2307,7 +2307,7 @@
           <a:p>
             <a:fld id="{6F434C57-7570-40AD-9CC2-DD9EBD30B3BB}" type="datetimeFigureOut">
               <a:rPr lang="en-US" smtClean="0"/>
-              <a:t>4/22/2022</a:t>
+              <a:t>5/5/2022</a:t>
             </a:fld>
             <a:endParaRPr lang="en-US"/>
           </a:p>
@@ -2425,7 +2425,7 @@
           <a:p>
             <a:fld id="{6F434C57-7570-40AD-9CC2-DD9EBD30B3BB}" type="datetimeFigureOut">
               <a:rPr lang="en-US" smtClean="0"/>
-              <a:t>4/22/2022</a:t>
+              <a:t>5/5/2022</a:t>
             </a:fld>
             <a:endParaRPr lang="en-US"/>
           </a:p>
@@ -2520,7 +2520,7 @@
           <a:p>
             <a:fld id="{6F434C57-7570-40AD-9CC2-DD9EBD30B3BB}" type="datetimeFigureOut">
               <a:rPr lang="en-US" smtClean="0"/>
-              <a:t>4/22/2022</a:t>
+              <a:t>5/5/2022</a:t>
             </a:fld>
             <a:endParaRPr lang="en-US"/>
           </a:p>
@@ -2797,7 +2797,7 @@
           <a:p>
             <a:fld id="{6F434C57-7570-40AD-9CC2-DD9EBD30B3BB}" type="datetimeFigureOut">
               <a:rPr lang="en-US" smtClean="0"/>
-              <a:t>4/22/2022</a:t>
+              <a:t>5/5/2022</a:t>
             </a:fld>
             <a:endParaRPr lang="en-US"/>
           </a:p>
@@ -3054,7 +3054,7 @@
           <a:p>
             <a:fld id="{6F434C57-7570-40AD-9CC2-DD9EBD30B3BB}" type="datetimeFigureOut">
               <a:rPr lang="en-US" smtClean="0"/>
-              <a:t>4/22/2022</a:t>
+              <a:t>5/5/2022</a:t>
             </a:fld>
             <a:endParaRPr lang="en-US"/>
           </a:p>
@@ -3267,7 +3267,7 @@
           <a:p>
             <a:fld id="{6F434C57-7570-40AD-9CC2-DD9EBD30B3BB}" type="datetimeFigureOut">
               <a:rPr lang="en-US" smtClean="0"/>
-              <a:t>4/22/2022</a:t>
+              <a:t>5/5/2022</a:t>
             </a:fld>
             <a:endParaRPr lang="en-US"/>
           </a:p>
@@ -3656,7 +3656,7 @@
 </file>
 
 <file path=ppt/slides/slide1.xml><?xml version="1.0" encoding="utf-8"?>
-<p:sld xmlns:a="http://schemas.openxmlformats.org/drawingml/2006/main" xmlns:r="http://schemas.openxmlformats.org/officeDocument/2006/relationships" xmlns:p="http://schemas.openxmlformats.org/presentationml/2006/main" show="0">
+<p:sld xmlns:a="http://schemas.openxmlformats.org/drawingml/2006/main" xmlns:r="http://schemas.openxmlformats.org/officeDocument/2006/relationships" xmlns:p="http://schemas.openxmlformats.org/presentationml/2006/main">
   <p:cSld>
     <p:spTree>
       <p:nvGrpSpPr>
@@ -3746,7 +3746,7 @@
 </file>
 
 <file path=ppt/slides/slide2.xml><?xml version="1.0" encoding="utf-8"?>
-<p:sld xmlns:a="http://schemas.openxmlformats.org/drawingml/2006/main" xmlns:r="http://schemas.openxmlformats.org/officeDocument/2006/relationships" xmlns:p="http://schemas.openxmlformats.org/presentationml/2006/main" show="0">
+<p:sld xmlns:a="http://schemas.openxmlformats.org/drawingml/2006/main" xmlns:r="http://schemas.openxmlformats.org/officeDocument/2006/relationships" xmlns:p="http://schemas.openxmlformats.org/presentationml/2006/main">
   <p:cSld>
     <p:spTree>
       <p:nvGrpSpPr>
@@ -5178,7 +5178,7 @@
 </file>
 
 <file path=ppt/slides/slide3.xml><?xml version="1.0" encoding="utf-8"?>
-<p:sld xmlns:a="http://schemas.openxmlformats.org/drawingml/2006/main" xmlns:r="http://schemas.openxmlformats.org/officeDocument/2006/relationships" xmlns:p="http://schemas.openxmlformats.org/presentationml/2006/main" show="0">
+<p:sld xmlns:a="http://schemas.openxmlformats.org/drawingml/2006/main" xmlns:r="http://schemas.openxmlformats.org/officeDocument/2006/relationships" xmlns:p="http://schemas.openxmlformats.org/presentationml/2006/main">
   <p:cSld>
     <p:spTree>
       <p:nvGrpSpPr>
@@ -7652,7 +7652,7 @@
                                           </p:stCondLst>
                                         </p:cTn>
                                         <p:tgtEl>
-                                          <p:spTgt spid="55"/>
+                                          <p:spTgt spid="39"/>
                                         </p:tgtEl>
                                         <p:attrNameLst>
                                           <p:attrName>style.visibility</p:attrName>
@@ -7697,7 +7697,7 @@
                                           </p:stCondLst>
                                         </p:cTn>
                                         <p:tgtEl>
-                                          <p:spTgt spid="46"/>
+                                          <p:spTgt spid="44"/>
                                         </p:tgtEl>
                                         <p:attrNameLst>
                                           <p:attrName>style.visibility</p:attrName>
@@ -7742,7 +7742,7 @@
                                           </p:stCondLst>
                                         </p:cTn>
                                         <p:tgtEl>
-                                          <p:spTgt spid="44"/>
+                                          <p:spTgt spid="46"/>
                                         </p:tgtEl>
                                         <p:attrNameLst>
                                           <p:attrName>style.visibility</p:attrName>
@@ -7787,7 +7787,7 @@
                                           </p:stCondLst>
                                         </p:cTn>
                                         <p:tgtEl>
-                                          <p:spTgt spid="39"/>
+                                          <p:spTgt spid="55"/>
                                         </p:tgtEl>
                                         <p:attrNameLst>
                                           <p:attrName>style.visibility</p:attrName>
@@ -8114,7 +8114,7 @@
 </file>
 
 <file path=ppt/slides/slide4.xml><?xml version="1.0" encoding="utf-8"?>
-<p:sld xmlns:a="http://schemas.openxmlformats.org/drawingml/2006/main" xmlns:r="http://schemas.openxmlformats.org/officeDocument/2006/relationships" xmlns:p="http://schemas.openxmlformats.org/presentationml/2006/main" show="0">
+<p:sld xmlns:a="http://schemas.openxmlformats.org/drawingml/2006/main" xmlns:r="http://schemas.openxmlformats.org/officeDocument/2006/relationships" xmlns:p="http://schemas.openxmlformats.org/presentationml/2006/main">
   <p:cSld>
     <p:spTree>
       <p:nvGrpSpPr>
@@ -12652,7 +12652,7 @@
 </file>
 
 <file path=ppt/slides/slide5.xml><?xml version="1.0" encoding="utf-8"?>
-<p:sld xmlns:a="http://schemas.openxmlformats.org/drawingml/2006/main" xmlns:r="http://schemas.openxmlformats.org/officeDocument/2006/relationships" xmlns:p="http://schemas.openxmlformats.org/presentationml/2006/main" show="0">
+<p:sld xmlns:a="http://schemas.openxmlformats.org/drawingml/2006/main" xmlns:r="http://schemas.openxmlformats.org/officeDocument/2006/relationships" xmlns:p="http://schemas.openxmlformats.org/presentationml/2006/main">
   <p:cSld>
     <p:spTree>
       <p:nvGrpSpPr>

</xml_diff>